<commit_message>
Changed some CSS attributes. Changed layout a bit.
Signed-off-by: Scott Beddall <sbeddall@gmail.com>
</commit_message>
<xml_diff>
--- a/doc/final_presentation.pptx
+++ b/doc/final_presentation.pptx
@@ -3418,16 +3418,6 @@
             </a:pPr>
             <a:endParaRPr lang="en-US" sz="2000" dirty="0" smtClean="0"/>
           </a:p>
-          <a:p>
-            <a:pPr>
-              <a:buNone/>
-            </a:pPr>
-            <a:r>
-              <a:rPr lang="en-US" sz="2000" dirty="0" smtClean="0"/>
-              <a:t>	Pictures will go here. Maybe the next slide as well.</a:t>
-            </a:r>
-            <a:endParaRPr lang="en-US" sz="2000" dirty="0"/>
-          </a:p>
         </p:txBody>
       </p:sp>
     </p:spTree>
@@ -3494,11 +3484,9 @@
           <a:bodyPr/>
           <a:lstStyle/>
           <a:p>
-            <a:pPr lvl="1"/>
-            <a:r>
-              <a:rPr lang="en-US" dirty="0" smtClean="0"/>
-              <a:t>Screenshots</a:t>
-            </a:r>
+            <a:pPr lvl="1">
+              <a:buNone/>
+            </a:pPr>
             <a:endParaRPr lang="en-US" dirty="0"/>
           </a:p>
         </p:txBody>
@@ -3887,7 +3875,7 @@
           <a:p>
             <a:r>
               <a:rPr lang="en-US" dirty="0" smtClean="0"/>
-              <a:t> Team Picture goes here</a:t>
+              <a:t> </a:t>
             </a:r>
             <a:endParaRPr lang="en-US" dirty="0"/>
           </a:p>
@@ -3905,7 +3893,7 @@
         </p:nvSpPr>
         <p:spPr>
           <a:xfrm>
-            <a:off x="536575" y="2906712"/>
+            <a:off x="536575" y="3211512"/>
             <a:ext cx="4040188" cy="3951288"/>
           </a:xfrm>
         </p:spPr>
@@ -4089,7 +4077,7 @@
         </p:nvSpPr>
         <p:spPr>
           <a:xfrm>
-            <a:off x="4724400" y="2906712"/>
+            <a:off x="4724400" y="3211512"/>
             <a:ext cx="4041775" cy="3951288"/>
           </a:xfrm>
         </p:spPr>
@@ -4235,6 +4223,30 @@
           </a:p>
         </p:txBody>
       </p:sp>
+      <p:pic>
+        <p:nvPicPr>
+          <p:cNvPr id="7" name="Picture 6" descr="IMAG0090.jpg"/>
+          <p:cNvPicPr>
+            <a:picLocks noChangeAspect="1"/>
+          </p:cNvPicPr>
+          <p:nvPr/>
+        </p:nvPicPr>
+        <p:blipFill>
+          <a:blip r:embed="rId2" cstate="print"/>
+          <a:stretch>
+            <a:fillRect/>
+          </a:stretch>
+        </p:blipFill>
+        <p:spPr>
+          <a:xfrm>
+            <a:off x="3276600" y="609600"/>
+            <a:ext cx="5638800" cy="3372224"/>
+          </a:xfrm>
+          <a:prstGeom prst="rect">
+            <a:avLst/>
+          </a:prstGeom>
+        </p:spPr>
+      </p:pic>
     </p:spTree>
   </p:cSld>
   <p:clrMapOvr>

</xml_diff>